<commit_message>
Add apk file, fix coursework and presentation
</commit_message>
<xml_diff>
--- a/documentation/Презентация продукта.pptx
+++ b/documentation/Презентация продукта.pptx
@@ -132,7 +132,7 @@
     <p1510:client id="{1A190BDB-38C0-465A-B5E8-EF9F6808A4EB}" v="1283" dt="2024-05-29T22:12:29.370"/>
     <p1510:client id="{1BCF3A0A-5D0D-41DD-AACC-3F3FD5972E25}" v="309" dt="2024-05-30T07:04:02.964"/>
     <p1510:client id="{269F87C0-091D-4D39-A300-2E25333606EE}" v="1596" dt="2024-05-29T13:08:02.465"/>
-    <p1510:client id="{5E479411-4741-4291-ABCB-23B8A2E03DA6}" v="163" dt="2024-05-30T09:00:28.797"/>
+    <p1510:client id="{5E479411-4741-4291-ABCB-23B8A2E03DA6}" v="208" dt="2024-05-30T11:17:04.329"/>
     <p1510:client id="{E9CA3BBD-BC64-430E-829B-682AAB8C6EF0}" v="3" dt="2024-05-29T22:14:13.658"/>
   </p1510:revLst>
 </p1510:revInfo>
@@ -634,7 +634,7 @@
           <a:p>
             <a:fld id="{F7021451-1387-4CA6-816F-3879F97B5CBC}" type="slidenum">
               <a:rPr lang="en-US"/>
-              <a:t>12</a:t>
+              <a:t>13</a:t>
             </a:fld>
             <a:endParaRPr lang="en-US"/>
           </a:p>
@@ -718,7 +718,7 @@
           <a:p>
             <a:fld id="{F7021451-1387-4CA6-816F-3879F97B5CBC}" type="slidenum">
               <a:rPr lang="en-US"/>
-              <a:t>13</a:t>
+              <a:t>14</a:t>
             </a:fld>
             <a:endParaRPr lang="en-US"/>
           </a:p>
@@ -802,7 +802,7 @@
           <a:p>
             <a:fld id="{F7021451-1387-4CA6-816F-3879F97B5CBC}" type="slidenum">
               <a:rPr lang="en-US"/>
-              <a:t>14</a:t>
+              <a:t>15</a:t>
             </a:fld>
             <a:endParaRPr lang="en-US"/>
           </a:p>
@@ -1390,7 +1390,7 @@
           <a:p>
             <a:fld id="{F7021451-1387-4CA6-816F-3879F97B5CBC}" type="slidenum">
               <a:rPr lang="en-US"/>
-              <a:t>9</a:t>
+              <a:t>10</a:t>
             </a:fld>
             <a:endParaRPr lang="en-US"/>
           </a:p>
@@ -1474,7 +1474,7 @@
           <a:p>
             <a:fld id="{F7021451-1387-4CA6-816F-3879F97B5CBC}" type="slidenum">
               <a:rPr lang="en-US"/>
-              <a:t>11</a:t>
+              <a:t>12</a:t>
             </a:fld>
             <a:endParaRPr lang="en-US"/>
           </a:p>
@@ -2203,10 +2203,10 @@
       </p:pic>
       <p:sp>
         <p:nvSpPr>
-          <p:cNvPr id="3" name="TextBox 2">
+          <p:cNvPr id="4" name="TextBox 3">
             <a:extLst>
               <a:ext uri="{FF2B5EF4-FFF2-40B4-BE49-F238E27FC236}">
-                <a16:creationId xmlns:a16="http://schemas.microsoft.com/office/drawing/2014/main" id="{2156C04B-BA33-8F43-8E56-13CAAC83C8BE}"/>
+                <a16:creationId xmlns:a16="http://schemas.microsoft.com/office/drawing/2014/main" id="{B31D0699-A9C8-D696-2CF3-9D44B9585681}"/>
               </a:ext>
             </a:extLst>
           </p:cNvPr>
@@ -2215,8 +2215,8 @@
         </p:nvSpPr>
         <p:spPr>
           <a:xfrm>
-            <a:off x="14249400" y="7821168"/>
-            <a:ext cx="377952" cy="400110"/>
+            <a:off x="14115288" y="7821168"/>
+            <a:ext cx="512064" cy="400110"/>
           </a:xfrm>
           <a:prstGeom prst="rect">
             <a:avLst/>
@@ -2241,7 +2241,7 @@
                 <a:latin typeface="Century Gothic"/>
                 <a:cs typeface="Calibri"/>
               </a:rPr>
-              <a:t>9</a:t>
+              <a:t>10</a:t>
             </a:r>
             <a:endParaRPr lang="ru-RU" sz="2000" b="1" dirty="0">
               <a:solidFill>
@@ -2471,7 +2471,7 @@
                 <a:latin typeface="Century Gothic"/>
                 <a:cs typeface="Calibri"/>
               </a:rPr>
-              <a:t>10</a:t>
+              <a:t>11</a:t>
             </a:r>
             <a:endParaRPr lang="ru-RU" sz="2000" b="1" dirty="0">
               <a:solidFill>
@@ -2864,7 +2864,7 @@
                 <a:latin typeface="Century Gothic"/>
                 <a:cs typeface="Calibri"/>
               </a:rPr>
-              <a:t>11</a:t>
+              <a:t>12</a:t>
             </a:r>
             <a:endParaRPr lang="ru-RU" sz="2000" b="1" dirty="0">
               <a:solidFill>
@@ -3602,7 +3602,7 @@
                 <a:latin typeface="Century Gothic"/>
                 <a:cs typeface="Calibri"/>
               </a:rPr>
-              <a:t>12</a:t>
+              <a:t>13</a:t>
             </a:r>
             <a:endParaRPr lang="ru-RU" sz="2000" b="1" dirty="0">
               <a:solidFill>
@@ -3978,7 +3978,7 @@
                 <a:latin typeface="Century Gothic"/>
                 <a:cs typeface="Calibri"/>
               </a:rPr>
-              <a:t>13</a:t>
+              <a:t>14</a:t>
             </a:r>
             <a:endParaRPr lang="ru-RU" sz="2000" b="1" dirty="0">
               <a:solidFill>
@@ -4199,7 +4199,7 @@
                 <a:latin typeface="Century Gothic"/>
                 <a:cs typeface="Calibri"/>
               </a:rPr>
-              <a:t>14</a:t>
+              <a:t>15</a:t>
             </a:r>
             <a:endParaRPr lang="ru-RU" sz="2000" b="1" dirty="0">
               <a:solidFill>
@@ -7316,8 +7316,8 @@
         </p:nvSpPr>
         <p:spPr>
           <a:xfrm>
-            <a:off x="5900762" y="2191941"/>
-            <a:ext cx="2490835" cy="469106"/>
+            <a:off x="6566968" y="2191941"/>
+            <a:ext cx="1171487" cy="469106"/>
           </a:xfrm>
           <a:prstGeom prst="rect">
             <a:avLst/>
@@ -7335,22 +7335,10 @@
               </a:lnSpc>
             </a:pPr>
             <a:r>
-              <a:rPr lang="en-US" sz="2800" b="1" dirty="0" err="1">
-                <a:latin typeface="Century Gothic"/>
-              </a:rPr>
-              <a:t>База</a:t>
-            </a:r>
-            <a:r>
               <a:rPr lang="en-US" sz="2800" b="1" dirty="0">
                 <a:latin typeface="Century Gothic"/>
               </a:rPr>
-              <a:t> </a:t>
-            </a:r>
-            <a:r>
-              <a:rPr lang="en-US" sz="2800" b="1" dirty="0" err="1">
-                <a:latin typeface="Century Gothic"/>
-              </a:rPr>
-              <a:t>данных</a:t>
+              <a:t>СУБД</a:t>
             </a:r>
           </a:p>
         </p:txBody>
@@ -8113,7 +8101,7 @@
                 <a:latin typeface="Century Gothic"/>
                 <a:cs typeface="Calibri"/>
               </a:rPr>
-              <a:t>8</a:t>
+              <a:t>9</a:t>
             </a:r>
             <a:endParaRPr lang="ru-RU" sz="2000" b="1" dirty="0">
               <a:solidFill>

</xml_diff>